<commit_message>
Updated documents after class.
</commit_message>
<xml_diff>
--- a/CPSC-24700/Presentations/session-11.pptx
+++ b/CPSC-24700/Presentations/session-11.pptx
@@ -121,6 +121,10 @@
 </p:presentation>
 </file>
 
+<file path=ppt/revisionInfo.xml><?xml version="1.0" encoding="utf-8"?>
+<p1510:revInfo xmlns:a="http://schemas.openxmlformats.org/drawingml/2006/main" xmlns:r="http://schemas.openxmlformats.org/officeDocument/2006/relationships" xmlns:p1510="http://schemas.microsoft.com/office/powerpoint/2015/10/main"/>
+</file>
+
 <file path=ppt/notesMasters/notesMaster1.xml><?xml version="1.0" encoding="utf-8"?>
 <p:notesMaster xmlns:a="http://schemas.openxmlformats.org/drawingml/2006/main" xmlns:r="http://schemas.openxmlformats.org/officeDocument/2006/relationships" xmlns:p="http://schemas.openxmlformats.org/presentationml/2006/main">
   <p:cSld>
@@ -203,7 +207,7 @@
           <a:p>
             <a:fld id="{1CF91C02-A59E-4778-8D4F-4840DBBEFA68}" type="datetimeFigureOut">
               <a:rPr lang="en-US" smtClean="0"/>
-              <a:t>9/21/2017</a:t>
+              <a:t>9/22/2017</a:t>
             </a:fld>
             <a:endParaRPr lang="en-US"/>
           </a:p>
@@ -1237,7 +1241,7 @@
           <a:p>
             <a:fld id="{5FB62F81-FD80-4AA8-93CA-E835B40BE667}" type="datetimeFigureOut">
               <a:rPr lang="en-US" smtClean="0"/>
-              <a:t>9/21/2017</a:t>
+              <a:t>9/22/2017</a:t>
             </a:fld>
             <a:endParaRPr lang="en-US"/>
           </a:p>
@@ -1435,7 +1439,7 @@
           <a:p>
             <a:fld id="{5FB62F81-FD80-4AA8-93CA-E835B40BE667}" type="datetimeFigureOut">
               <a:rPr lang="en-US" smtClean="0"/>
-              <a:t>9/21/2017</a:t>
+              <a:t>9/22/2017</a:t>
             </a:fld>
             <a:endParaRPr lang="en-US"/>
           </a:p>
@@ -1643,7 +1647,7 @@
           <a:p>
             <a:fld id="{5FB62F81-FD80-4AA8-93CA-E835B40BE667}" type="datetimeFigureOut">
               <a:rPr lang="en-US" smtClean="0"/>
-              <a:t>9/21/2017</a:t>
+              <a:t>9/22/2017</a:t>
             </a:fld>
             <a:endParaRPr lang="en-US"/>
           </a:p>
@@ -1841,7 +1845,7 @@
           <a:p>
             <a:fld id="{5FB62F81-FD80-4AA8-93CA-E835B40BE667}" type="datetimeFigureOut">
               <a:rPr lang="en-US" smtClean="0"/>
-              <a:t>9/21/2017</a:t>
+              <a:t>9/22/2017</a:t>
             </a:fld>
             <a:endParaRPr lang="en-US"/>
           </a:p>
@@ -2116,7 +2120,7 @@
           <a:p>
             <a:fld id="{5FB62F81-FD80-4AA8-93CA-E835B40BE667}" type="datetimeFigureOut">
               <a:rPr lang="en-US" smtClean="0"/>
-              <a:t>9/21/2017</a:t>
+              <a:t>9/22/2017</a:t>
             </a:fld>
             <a:endParaRPr lang="en-US"/>
           </a:p>
@@ -2381,7 +2385,7 @@
           <a:p>
             <a:fld id="{5FB62F81-FD80-4AA8-93CA-E835B40BE667}" type="datetimeFigureOut">
               <a:rPr lang="en-US" smtClean="0"/>
-              <a:t>9/21/2017</a:t>
+              <a:t>9/22/2017</a:t>
             </a:fld>
             <a:endParaRPr lang="en-US"/>
           </a:p>
@@ -2793,7 +2797,7 @@
           <a:p>
             <a:fld id="{5FB62F81-FD80-4AA8-93CA-E835B40BE667}" type="datetimeFigureOut">
               <a:rPr lang="en-US" smtClean="0"/>
-              <a:t>9/21/2017</a:t>
+              <a:t>9/22/2017</a:t>
             </a:fld>
             <a:endParaRPr lang="en-US"/>
           </a:p>
@@ -2934,7 +2938,7 @@
           <a:p>
             <a:fld id="{5FB62F81-FD80-4AA8-93CA-E835B40BE667}" type="datetimeFigureOut">
               <a:rPr lang="en-US" smtClean="0"/>
-              <a:t>9/21/2017</a:t>
+              <a:t>9/22/2017</a:t>
             </a:fld>
             <a:endParaRPr lang="en-US"/>
           </a:p>
@@ -3047,7 +3051,7 @@
           <a:p>
             <a:fld id="{5FB62F81-FD80-4AA8-93CA-E835B40BE667}" type="datetimeFigureOut">
               <a:rPr lang="en-US" smtClean="0"/>
-              <a:t>9/21/2017</a:t>
+              <a:t>9/22/2017</a:t>
             </a:fld>
             <a:endParaRPr lang="en-US"/>
           </a:p>
@@ -3358,7 +3362,7 @@
           <a:p>
             <a:fld id="{5FB62F81-FD80-4AA8-93CA-E835B40BE667}" type="datetimeFigureOut">
               <a:rPr lang="en-US" smtClean="0"/>
-              <a:t>9/21/2017</a:t>
+              <a:t>9/22/2017</a:t>
             </a:fld>
             <a:endParaRPr lang="en-US"/>
           </a:p>
@@ -3646,7 +3650,7 @@
           <a:p>
             <a:fld id="{5FB62F81-FD80-4AA8-93CA-E835B40BE667}" type="datetimeFigureOut">
               <a:rPr lang="en-US" smtClean="0"/>
-              <a:t>9/21/2017</a:t>
+              <a:t>9/22/2017</a:t>
             </a:fld>
             <a:endParaRPr lang="en-US"/>
           </a:p>
@@ -3887,7 +3891,7 @@
           <a:p>
             <a:fld id="{5FB62F81-FD80-4AA8-93CA-E835B40BE667}" type="datetimeFigureOut">
               <a:rPr lang="en-US" smtClean="0"/>
-              <a:t>9/21/2017</a:t>
+              <a:t>9/22/2017</a:t>
             </a:fld>
             <a:endParaRPr lang="en-US"/>
           </a:p>
@@ -4348,7 +4352,7 @@
             </a:br>
             <a:r>
               <a:rPr lang="en-US" sz="1800" dirty="0"/>
-              <a:t>Session: 9</a:t>
+              <a:t>Session: 11</a:t>
             </a:r>
           </a:p>
         </p:txBody>
@@ -4790,7 +4794,7 @@
           <a:p>
             <a:r>
               <a:rPr lang="en-US" sz="2000" dirty="0"/>
-              <a:t>Take Quiz 2 first attempt… final attempt is due next Wednesday</a:t>
+              <a:t>Take Quiz 2 (first attempt)… final attempt is due next Wednesday</a:t>
             </a:r>
           </a:p>
           <a:p>

</xml_diff>